<commit_message>
presentations added and modified
</commit_message>
<xml_diff>
--- a/intel_ocr/docs/intel_internal_review_7thNov.pptx
+++ b/intel_ocr/docs/intel_internal_review_7thNov.pptx
@@ -10165,13 +10165,8 @@
             </a:pPr>
             <a:r>
               <a:rPr lang="en-US" dirty="0" smtClean="0"/>
-              <a:t>3. Inputs from </a:t>
-            </a:r>
-            <a:r>
-              <a:rPr lang="en-US" dirty="0" smtClean="0"/>
-              <a:t>customer [ For tuning Parameters ]</a:t>
-            </a:r>
-            <a:endParaRPr lang="en-US" dirty="0" smtClean="0"/>
+              <a:t>3. Inputs from customer [ For tuning Parameters ]</a:t>
+            </a:r>
           </a:p>
           <a:p>
             <a:pPr marL="0" indent="0">
@@ -10183,11 +10178,7 @@
             </a:r>
             <a:r>
               <a:rPr lang="en-US" sz="1400" dirty="0" smtClean="0"/>
-              <a:t>3.1 Sample Image </a:t>
-            </a:r>
-            <a:r>
-              <a:rPr lang="en-US" sz="1400" dirty="0" smtClean="0"/>
-              <a:t>Testing</a:t>
+              <a:t>3.1 Sample Image Testing</a:t>
             </a:r>
             <a:endParaRPr lang="en-US" dirty="0"/>
           </a:p>
@@ -13412,7 +13403,7 @@
           <p:nvPr>
             <p:extLst>
               <p:ext uri="{D42A27DB-BD31-4B8C-83A1-F6EECF244321}">
-                <p14:modId xmlns:p14="http://schemas.microsoft.com/office/powerpoint/2010/main" val="874234608"/>
+                <p14:modId xmlns:p14="http://schemas.microsoft.com/office/powerpoint/2010/main" val="2692371946"/>
               </p:ext>
             </p:extLst>
           </p:nvPr>
@@ -13595,7 +13586,23 @@
                             <a:srgbClr val="000000"/>
                           </a:solidFill>
                         </a:rPr>
-                        <a:t>Currently Sample application takes images as a input and provides images a output with right, wrong and undetermined bounding boxes with color coding. Image and Text output is being saved in a folder with respective image name and timestamp.</a:t>
+                        <a:t>Currently Sample application takes images as a input and provides images a output with right, wrong and undetermined bounding boxes with color coding. Image and Text output is being saved in </a:t>
+                      </a:r>
+                      <a:r>
+                        <a:rPr lang="en-US" sz="1400" kern="0" dirty="0" smtClean="0">
+                          <a:solidFill>
+                            <a:srgbClr val="000000"/>
+                          </a:solidFill>
+                        </a:rPr>
+                        <a:t>‘logs’ folder </a:t>
+                      </a:r>
+                      <a:r>
+                        <a:rPr lang="en-US" sz="1400" kern="0" dirty="0" smtClean="0">
+                          <a:solidFill>
+                            <a:srgbClr val="000000"/>
+                          </a:solidFill>
+                        </a:rPr>
+                        <a:t>with respective image name and timestamp.</a:t>
                       </a:r>
                     </a:p>
                     <a:p>
@@ -13862,14 +13869,25 @@
                             <a:noFill/>
                           </a:ln>
                           <a:solidFill>
-                            <a:srgbClr val="FF0000"/>
+                            <a:schemeClr val="tx1"/>
                           </a:solidFill>
                           <a:effectLst/>
                           <a:uLnTx/>
                           <a:uFillTx/>
                         </a:rPr>
-                        <a:t>No</a:t>
+                        <a:t>Yes</a:t>
                       </a:r>
+                      <a:endParaRPr kumimoji="0" lang="en-US" sz="1400" b="0" i="0" u="none" strike="noStrike" kern="0" cap="none" spc="0" normalizeH="0" baseline="0" noProof="0" dirty="0" smtClean="0">
+                        <a:ln>
+                          <a:noFill/>
+                        </a:ln>
+                        <a:solidFill>
+                          <a:schemeClr val="tx1"/>
+                        </a:solidFill>
+                        <a:effectLst/>
+                        <a:uLnTx/>
+                        <a:uFillTx/>
+                      </a:endParaRPr>
                     </a:p>
                     <a:p>
                       <a:pPr marL="0" marR="0" lvl="0" indent="0" algn="l" defTabSz="914333" rtl="0" eaLnBrk="1" fontAlgn="auto" latinLnBrk="0" hangingPunct="1">
@@ -14807,17 +14825,6 @@
               </a:rPr>
               <a:t> </a:t>
             </a:r>
-            <a:endParaRPr kumimoji="0" lang="en-US" sz="1800" b="0" i="0" u="none" strike="noStrike" kern="0" cap="none" spc="0" normalizeH="0" baseline="0" noProof="0" dirty="0" smtClean="0">
-              <a:ln>
-                <a:noFill/>
-              </a:ln>
-              <a:solidFill>
-                <a:srgbClr val="000000"/>
-              </a:solidFill>
-              <a:effectLst/>
-              <a:uLnTx/>
-              <a:uFillTx/>
-            </a:endParaRPr>
           </a:p>
         </p:txBody>
       </p:sp>

</xml_diff>